<commit_message>
Added slides and examples  to advanced OOP
</commit_message>
<xml_diff>
--- a/08.advanced-oop.pptx
+++ b/08.advanced-oop.pptx
@@ -15,6 +15,15 @@
     <p:sldId id="262" r:id="rId9"/>
     <p:sldId id="263" r:id="rId10"/>
     <p:sldId id="265" r:id="rId11"/>
+    <p:sldId id="266" r:id="rId12"/>
+    <p:sldId id="267" r:id="rId13"/>
+    <p:sldId id="268" r:id="rId14"/>
+    <p:sldId id="269" r:id="rId15"/>
+    <p:sldId id="270" r:id="rId16"/>
+    <p:sldId id="271" r:id="rId17"/>
+    <p:sldId id="272" r:id="rId18"/>
+    <p:sldId id="273" r:id="rId19"/>
+    <p:sldId id="274" r:id="rId20"/>
   </p:sldIdLst>
   <p:sldSz cx="12192000" cy="6858000"/>
   <p:notesSz cx="6858000" cy="9144000"/>
@@ -171,7 +180,7 @@
           <a:noFill/>
           <a:extLst>
             <a:ext uri="{909E8E84-426E-40dd-AFC4-6F175D3DCCD1}">
-              <a14:hiddenFill xmlns="" xmlns:a14="http://schemas.microsoft.com/office/drawing/2010/main">
+              <a14:hiddenFill xmlns:a14="http://schemas.microsoft.com/office/drawing/2010/main" xmlns="">
                 <a:solidFill>
                   <a:srgbClr val="FFFFFF"/>
                 </a:solidFill>
@@ -231,7 +240,7 @@
             </a:ln>
             <a:extLst>
               <a:ext uri="{91240B29-F687-4f45-9708-019B960494DF}">
-                <a14:hiddenLine xmlns="" xmlns:a14="http://schemas.microsoft.com/office/drawing/2010/main" w="9525">
+                <a14:hiddenLine xmlns:a14="http://schemas.microsoft.com/office/drawing/2010/main" xmlns="" w="9525">
                   <a:solidFill>
                     <a:srgbClr val="000000"/>
                   </a:solidFill>
@@ -321,7 +330,7 @@
             </a:ln>
             <a:extLst>
               <a:ext uri="{91240B29-F687-4f45-9708-019B960494DF}">
-                <a14:hiddenLine xmlns="" xmlns:a14="http://schemas.microsoft.com/office/drawing/2010/main" w="9525">
+                <a14:hiddenLine xmlns:a14="http://schemas.microsoft.com/office/drawing/2010/main" xmlns="" w="9525">
                   <a:solidFill>
                     <a:srgbClr val="000000"/>
                   </a:solidFill>
@@ -411,7 +420,7 @@
             </a:ln>
             <a:extLst>
               <a:ext uri="{91240B29-F687-4f45-9708-019B960494DF}">
-                <a14:hiddenLine xmlns="" xmlns:a14="http://schemas.microsoft.com/office/drawing/2010/main" w="9525">
+                <a14:hiddenLine xmlns:a14="http://schemas.microsoft.com/office/drawing/2010/main" xmlns="" w="9525">
                   <a:solidFill>
                     <a:srgbClr val="000000"/>
                   </a:solidFill>
@@ -445,7 +454,7 @@
             </a:ln>
             <a:extLst>
               <a:ext uri="{91240B29-F687-4f45-9708-019B960494DF}">
-                <a14:hiddenLine xmlns="" xmlns:a14="http://schemas.microsoft.com/office/drawing/2010/main" w="9525">
+                <a14:hiddenLine xmlns:a14="http://schemas.microsoft.com/office/drawing/2010/main" xmlns="" w="9525">
                   <a:solidFill>
                     <a:srgbClr val="000000"/>
                   </a:solidFill>
@@ -535,7 +544,7 @@
             </a:ln>
             <a:extLst>
               <a:ext uri="{91240B29-F687-4f45-9708-019B960494DF}">
-                <a14:hiddenLine xmlns="" xmlns:a14="http://schemas.microsoft.com/office/drawing/2010/main" w="9525">
+                <a14:hiddenLine xmlns:a14="http://schemas.microsoft.com/office/drawing/2010/main" xmlns="" w="9525">
                   <a:solidFill>
                     <a:srgbClr val="000000"/>
                   </a:solidFill>
@@ -597,7 +606,7 @@
             </a:ln>
             <a:extLst>
               <a:ext uri="{91240B29-F687-4f45-9708-019B960494DF}">
-                <a14:hiddenLine xmlns="" xmlns:a14="http://schemas.microsoft.com/office/drawing/2010/main" w="9525">
+                <a14:hiddenLine xmlns:a14="http://schemas.microsoft.com/office/drawing/2010/main" xmlns="" w="9525">
                   <a:solidFill>
                     <a:srgbClr val="000000"/>
                   </a:solidFill>
@@ -659,7 +668,7 @@
             </a:ln>
             <a:extLst>
               <a:ext uri="{91240B29-F687-4f45-9708-019B960494DF}">
-                <a14:hiddenLine xmlns="" xmlns:a14="http://schemas.microsoft.com/office/drawing/2010/main" w="9525">
+                <a14:hiddenLine xmlns:a14="http://schemas.microsoft.com/office/drawing/2010/main" xmlns="" w="9525">
                   <a:solidFill>
                     <a:srgbClr val="000000"/>
                   </a:solidFill>
@@ -749,7 +758,7 @@
             </a:ln>
             <a:extLst>
               <a:ext uri="{91240B29-F687-4f45-9708-019B960494DF}">
-                <a14:hiddenLine xmlns="" xmlns:a14="http://schemas.microsoft.com/office/drawing/2010/main" w="9525">
+                <a14:hiddenLine xmlns:a14="http://schemas.microsoft.com/office/drawing/2010/main" xmlns="" w="9525">
                   <a:solidFill>
                     <a:srgbClr val="000000"/>
                   </a:solidFill>
@@ -811,7 +820,7 @@
             </a:ln>
             <a:extLst>
               <a:ext uri="{91240B29-F687-4f45-9708-019B960494DF}">
-                <a14:hiddenLine xmlns="" xmlns:a14="http://schemas.microsoft.com/office/drawing/2010/main" w="9525">
+                <a14:hiddenLine xmlns:a14="http://schemas.microsoft.com/office/drawing/2010/main" xmlns="" w="9525">
                   <a:solidFill>
                     <a:srgbClr val="000000"/>
                   </a:solidFill>
@@ -873,7 +882,7 @@
             </a:ln>
             <a:extLst>
               <a:ext uri="{91240B29-F687-4f45-9708-019B960494DF}">
-                <a14:hiddenLine xmlns="" xmlns:a14="http://schemas.microsoft.com/office/drawing/2010/main" w="9525">
+                <a14:hiddenLine xmlns:a14="http://schemas.microsoft.com/office/drawing/2010/main" xmlns="" w="9525">
                   <a:solidFill>
                     <a:srgbClr val="000000"/>
                   </a:solidFill>
@@ -963,7 +972,7 @@
             </a:ln>
             <a:extLst>
               <a:ext uri="{91240B29-F687-4f45-9708-019B960494DF}">
-                <a14:hiddenLine xmlns="" xmlns:a14="http://schemas.microsoft.com/office/drawing/2010/main" w="9525">
+                <a14:hiddenLine xmlns:a14="http://schemas.microsoft.com/office/drawing/2010/main" xmlns="" w="9525">
                   <a:solidFill>
                     <a:srgbClr val="000000"/>
                   </a:solidFill>
@@ -1053,7 +1062,7 @@
             </a:ln>
             <a:extLst>
               <a:ext uri="{91240B29-F687-4f45-9708-019B960494DF}">
-                <a14:hiddenLine xmlns="" xmlns:a14="http://schemas.microsoft.com/office/drawing/2010/main" w="9525">
+                <a14:hiddenLine xmlns:a14="http://schemas.microsoft.com/office/drawing/2010/main" xmlns="" w="9525">
                   <a:solidFill>
                     <a:srgbClr val="000000"/>
                   </a:solidFill>
@@ -1115,7 +1124,7 @@
             </a:ln>
             <a:extLst>
               <a:ext uri="{91240B29-F687-4f45-9708-019B960494DF}">
-                <a14:hiddenLine xmlns="" xmlns:a14="http://schemas.microsoft.com/office/drawing/2010/main" w="9525">
+                <a14:hiddenLine xmlns:a14="http://schemas.microsoft.com/office/drawing/2010/main" xmlns="" w="9525">
                   <a:solidFill>
                     <a:srgbClr val="000000"/>
                   </a:solidFill>
@@ -1225,7 +1234,7 @@
             </a:ln>
             <a:extLst>
               <a:ext uri="{91240B29-F687-4f45-9708-019B960494DF}">
-                <a14:hiddenLine xmlns="" xmlns:a14="http://schemas.microsoft.com/office/drawing/2010/main" w="9525">
+                <a14:hiddenLine xmlns:a14="http://schemas.microsoft.com/office/drawing/2010/main" xmlns="" w="9525">
                   <a:solidFill>
                     <a:srgbClr val="000000"/>
                   </a:solidFill>
@@ -1287,7 +1296,7 @@
             </a:ln>
             <a:extLst>
               <a:ext uri="{91240B29-F687-4f45-9708-019B960494DF}">
-                <a14:hiddenLine xmlns="" xmlns:a14="http://schemas.microsoft.com/office/drawing/2010/main" w="9525">
+                <a14:hiddenLine xmlns:a14="http://schemas.microsoft.com/office/drawing/2010/main" xmlns="" w="9525">
                   <a:solidFill>
                     <a:srgbClr val="000000"/>
                   </a:solidFill>
@@ -1377,7 +1386,7 @@
             </a:ln>
             <a:extLst>
               <a:ext uri="{91240B29-F687-4f45-9708-019B960494DF}">
-                <a14:hiddenLine xmlns="" xmlns:a14="http://schemas.microsoft.com/office/drawing/2010/main" w="9525">
+                <a14:hiddenLine xmlns:a14="http://schemas.microsoft.com/office/drawing/2010/main" xmlns="" w="9525">
                   <a:solidFill>
                     <a:srgbClr val="000000"/>
                   </a:solidFill>
@@ -1467,7 +1476,7 @@
             </a:ln>
             <a:extLst>
               <a:ext uri="{91240B29-F687-4f45-9708-019B960494DF}">
-                <a14:hiddenLine xmlns="" xmlns:a14="http://schemas.microsoft.com/office/drawing/2010/main" w="9525">
+                <a14:hiddenLine xmlns:a14="http://schemas.microsoft.com/office/drawing/2010/main" xmlns="" w="9525">
                   <a:solidFill>
                     <a:srgbClr val="000000"/>
                   </a:solidFill>
@@ -1529,7 +1538,7 @@
             </a:ln>
             <a:extLst>
               <a:ext uri="{91240B29-F687-4f45-9708-019B960494DF}">
-                <a14:hiddenLine xmlns="" xmlns:a14="http://schemas.microsoft.com/office/drawing/2010/main" w="9525">
+                <a14:hiddenLine xmlns:a14="http://schemas.microsoft.com/office/drawing/2010/main" xmlns="" w="9525">
                   <a:solidFill>
                     <a:srgbClr val="000000"/>
                   </a:solidFill>
@@ -1619,7 +1628,7 @@
             </a:ln>
             <a:extLst>
               <a:ext uri="{91240B29-F687-4f45-9708-019B960494DF}">
-                <a14:hiddenLine xmlns="" xmlns:a14="http://schemas.microsoft.com/office/drawing/2010/main" w="9525">
+                <a14:hiddenLine xmlns:a14="http://schemas.microsoft.com/office/drawing/2010/main" xmlns="" w="9525">
                   <a:solidFill>
                     <a:srgbClr val="000000"/>
                   </a:solidFill>
@@ -1709,7 +1718,7 @@
             </a:ln>
             <a:extLst>
               <a:ext uri="{91240B29-F687-4f45-9708-019B960494DF}">
-                <a14:hiddenLine xmlns="" xmlns:a14="http://schemas.microsoft.com/office/drawing/2010/main" w="9525">
+                <a14:hiddenLine xmlns:a14="http://schemas.microsoft.com/office/drawing/2010/main" xmlns="" w="9525">
                   <a:solidFill>
                     <a:srgbClr val="000000"/>
                   </a:solidFill>
@@ -1765,7 +1774,7 @@
             </a:ln>
             <a:extLst>
               <a:ext uri="{91240B29-F687-4f45-9708-019B960494DF}">
-                <a14:hiddenLine xmlns="" xmlns:a14="http://schemas.microsoft.com/office/drawing/2010/main" w="9525">
+                <a14:hiddenLine xmlns:a14="http://schemas.microsoft.com/office/drawing/2010/main" xmlns="" w="9525">
                   <a:solidFill>
                     <a:srgbClr val="000000"/>
                   </a:solidFill>
@@ -1855,7 +1864,7 @@
             </a:ln>
             <a:extLst>
               <a:ext uri="{91240B29-F687-4f45-9708-019B960494DF}">
-                <a14:hiddenLine xmlns="" xmlns:a14="http://schemas.microsoft.com/office/drawing/2010/main" w="9525">
+                <a14:hiddenLine xmlns:a14="http://schemas.microsoft.com/office/drawing/2010/main" xmlns="" w="9525">
                   <a:solidFill>
                     <a:srgbClr val="000000"/>
                   </a:solidFill>
@@ -1911,7 +1920,7 @@
             </a:ln>
             <a:extLst>
               <a:ext uri="{91240B29-F687-4f45-9708-019B960494DF}">
-                <a14:hiddenLine xmlns="" xmlns:a14="http://schemas.microsoft.com/office/drawing/2010/main" w="9525">
+                <a14:hiddenLine xmlns:a14="http://schemas.microsoft.com/office/drawing/2010/main" xmlns="" w="9525">
                   <a:solidFill>
                     <a:srgbClr val="000000"/>
                   </a:solidFill>
@@ -2001,7 +2010,7 @@
             </a:ln>
             <a:extLst>
               <a:ext uri="{91240B29-F687-4f45-9708-019B960494DF}">
-                <a14:hiddenLine xmlns="" xmlns:a14="http://schemas.microsoft.com/office/drawing/2010/main" w="9525">
+                <a14:hiddenLine xmlns:a14="http://schemas.microsoft.com/office/drawing/2010/main" xmlns="" w="9525">
                   <a:solidFill>
                     <a:srgbClr val="000000"/>
                   </a:solidFill>
@@ -2069,7 +2078,7 @@
             </a:ln>
             <a:extLst>
               <a:ext uri="{91240B29-F687-4f45-9708-019B960494DF}">
-                <a14:hiddenLine xmlns="" xmlns:a14="http://schemas.microsoft.com/office/drawing/2010/main" w="9525">
+                <a14:hiddenLine xmlns:a14="http://schemas.microsoft.com/office/drawing/2010/main" xmlns="" w="9525">
                   <a:solidFill>
                     <a:srgbClr val="000000"/>
                   </a:solidFill>
@@ -2159,7 +2168,7 @@
             </a:ln>
             <a:extLst>
               <a:ext uri="{91240B29-F687-4f45-9708-019B960494DF}">
-                <a14:hiddenLine xmlns="" xmlns:a14="http://schemas.microsoft.com/office/drawing/2010/main" w="9525">
+                <a14:hiddenLine xmlns:a14="http://schemas.microsoft.com/office/drawing/2010/main" xmlns="" w="9525">
                   <a:solidFill>
                     <a:srgbClr val="000000"/>
                   </a:solidFill>
@@ -2227,7 +2236,7 @@
             </a:ln>
             <a:extLst>
               <a:ext uri="{91240B29-F687-4f45-9708-019B960494DF}">
-                <a14:hiddenLine xmlns="" xmlns:a14="http://schemas.microsoft.com/office/drawing/2010/main" w="9525">
+                <a14:hiddenLine xmlns:a14="http://schemas.microsoft.com/office/drawing/2010/main" xmlns="" w="9525">
                   <a:solidFill>
                     <a:srgbClr val="000000"/>
                   </a:solidFill>
@@ -2317,7 +2326,7 @@
             </a:ln>
             <a:extLst>
               <a:ext uri="{91240B29-F687-4f45-9708-019B960494DF}">
-                <a14:hiddenLine xmlns="" xmlns:a14="http://schemas.microsoft.com/office/drawing/2010/main" w="9525">
+                <a14:hiddenLine xmlns:a14="http://schemas.microsoft.com/office/drawing/2010/main" xmlns="" w="9525">
                   <a:solidFill>
                     <a:srgbClr val="000000"/>
                   </a:solidFill>
@@ -2351,7 +2360,7 @@
             </a:ln>
             <a:extLst>
               <a:ext uri="{91240B29-F687-4f45-9708-019B960494DF}">
-                <a14:hiddenLine xmlns="" xmlns:a14="http://schemas.microsoft.com/office/drawing/2010/main" w="9525">
+                <a14:hiddenLine xmlns:a14="http://schemas.microsoft.com/office/drawing/2010/main" xmlns="" w="9525">
                   <a:solidFill>
                     <a:srgbClr val="000000"/>
                   </a:solidFill>
@@ -2441,7 +2450,7 @@
             </a:ln>
             <a:extLst>
               <a:ext uri="{91240B29-F687-4f45-9708-019B960494DF}">
-                <a14:hiddenLine xmlns="" xmlns:a14="http://schemas.microsoft.com/office/drawing/2010/main" w="9525">
+                <a14:hiddenLine xmlns:a14="http://schemas.microsoft.com/office/drawing/2010/main" xmlns="" w="9525">
                   <a:solidFill>
                     <a:srgbClr val="000000"/>
                   </a:solidFill>
@@ -2503,7 +2512,7 @@
             </a:ln>
             <a:extLst>
               <a:ext uri="{91240B29-F687-4f45-9708-019B960494DF}">
-                <a14:hiddenLine xmlns="" xmlns:a14="http://schemas.microsoft.com/office/drawing/2010/main" w="9525">
+                <a14:hiddenLine xmlns:a14="http://schemas.microsoft.com/office/drawing/2010/main" xmlns="" w="9525">
                   <a:solidFill>
                     <a:srgbClr val="000000"/>
                   </a:solidFill>
@@ -2565,7 +2574,7 @@
             </a:ln>
             <a:extLst>
               <a:ext uri="{91240B29-F687-4f45-9708-019B960494DF}">
-                <a14:hiddenLine xmlns="" xmlns:a14="http://schemas.microsoft.com/office/drawing/2010/main" w="9525">
+                <a14:hiddenLine xmlns:a14="http://schemas.microsoft.com/office/drawing/2010/main" xmlns="" w="9525">
                   <a:solidFill>
                     <a:srgbClr val="000000"/>
                   </a:solidFill>
@@ -2655,7 +2664,7 @@
             </a:ln>
             <a:extLst>
               <a:ext uri="{91240B29-F687-4f45-9708-019B960494DF}">
-                <a14:hiddenLine xmlns="" xmlns:a14="http://schemas.microsoft.com/office/drawing/2010/main" w="9525">
+                <a14:hiddenLine xmlns:a14="http://schemas.microsoft.com/office/drawing/2010/main" xmlns="" w="9525">
                   <a:solidFill>
                     <a:srgbClr val="000000"/>
                   </a:solidFill>
@@ -2723,7 +2732,7 @@
             </a:ln>
             <a:extLst>
               <a:ext uri="{91240B29-F687-4f45-9708-019B960494DF}">
-                <a14:hiddenLine xmlns="" xmlns:a14="http://schemas.microsoft.com/office/drawing/2010/main" w="9525">
+                <a14:hiddenLine xmlns:a14="http://schemas.microsoft.com/office/drawing/2010/main" xmlns="" w="9525">
                   <a:solidFill>
                     <a:srgbClr val="000000"/>
                   </a:solidFill>
@@ -2785,7 +2794,7 @@
             </a:ln>
             <a:extLst>
               <a:ext uri="{91240B29-F687-4f45-9708-019B960494DF}">
-                <a14:hiddenLine xmlns="" xmlns:a14="http://schemas.microsoft.com/office/drawing/2010/main" w="9525">
+                <a14:hiddenLine xmlns:a14="http://schemas.microsoft.com/office/drawing/2010/main" xmlns="" w="9525">
                   <a:solidFill>
                     <a:srgbClr val="000000"/>
                   </a:solidFill>
@@ -2875,7 +2884,7 @@
             </a:ln>
             <a:extLst>
               <a:ext uri="{91240B29-F687-4f45-9708-019B960494DF}">
-                <a14:hiddenLine xmlns="" xmlns:a14="http://schemas.microsoft.com/office/drawing/2010/main" w="9525">
+                <a14:hiddenLine xmlns:a14="http://schemas.microsoft.com/office/drawing/2010/main" xmlns="" w="9525">
                   <a:solidFill>
                     <a:srgbClr val="000000"/>
                   </a:solidFill>
@@ -2937,7 +2946,7 @@
             </a:ln>
             <a:extLst>
               <a:ext uri="{91240B29-F687-4f45-9708-019B960494DF}">
-                <a14:hiddenLine xmlns="" xmlns:a14="http://schemas.microsoft.com/office/drawing/2010/main" w="9525">
+                <a14:hiddenLine xmlns:a14="http://schemas.microsoft.com/office/drawing/2010/main" xmlns="" w="9525">
                   <a:solidFill>
                     <a:srgbClr val="000000"/>
                   </a:solidFill>
@@ -3027,7 +3036,7 @@
             </a:ln>
             <a:extLst>
               <a:ext uri="{91240B29-F687-4f45-9708-019B960494DF}">
-                <a14:hiddenLine xmlns="" xmlns:a14="http://schemas.microsoft.com/office/drawing/2010/main" w="9525">
+                <a14:hiddenLine xmlns:a14="http://schemas.microsoft.com/office/drawing/2010/main" xmlns="" w="9525">
                   <a:solidFill>
                     <a:srgbClr val="000000"/>
                   </a:solidFill>
@@ -3089,7 +3098,7 @@
             </a:ln>
             <a:extLst>
               <a:ext uri="{91240B29-F687-4f45-9708-019B960494DF}">
-                <a14:hiddenLine xmlns="" xmlns:a14="http://schemas.microsoft.com/office/drawing/2010/main" w="9525">
+                <a14:hiddenLine xmlns:a14="http://schemas.microsoft.com/office/drawing/2010/main" xmlns="" w="9525">
                   <a:solidFill>
                     <a:srgbClr val="000000"/>
                   </a:solidFill>
@@ -3179,7 +3188,7 @@
             </a:ln>
             <a:extLst>
               <a:ext uri="{91240B29-F687-4f45-9708-019B960494DF}">
-                <a14:hiddenLine xmlns="" xmlns:a14="http://schemas.microsoft.com/office/drawing/2010/main" w="9525">
+                <a14:hiddenLine xmlns:a14="http://schemas.microsoft.com/office/drawing/2010/main" xmlns="" w="9525">
                   <a:solidFill>
                     <a:srgbClr val="000000"/>
                   </a:solidFill>
@@ -3213,7 +3222,7 @@
             </a:ln>
             <a:extLst>
               <a:ext uri="{91240B29-F687-4f45-9708-019B960494DF}">
-                <a14:hiddenLine xmlns="" xmlns:a14="http://schemas.microsoft.com/office/drawing/2010/main" w="9525">
+                <a14:hiddenLine xmlns:a14="http://schemas.microsoft.com/office/drawing/2010/main" xmlns="" w="9525">
                   <a:solidFill>
                     <a:srgbClr val="000000"/>
                   </a:solidFill>
@@ -3278,7 +3287,7 @@
             </a:ln>
             <a:extLst>
               <a:ext uri="{91240B29-F687-4f45-9708-019B960494DF}">
-                <a14:hiddenLine xmlns="" xmlns:a14="http://schemas.microsoft.com/office/drawing/2010/main" w="9525">
+                <a14:hiddenLine xmlns:a14="http://schemas.microsoft.com/office/drawing/2010/main" xmlns="" w="9525">
                   <a:solidFill>
                     <a:srgbClr val="000000"/>
                   </a:solidFill>
@@ -3368,7 +3377,7 @@
             </a:ln>
             <a:extLst>
               <a:ext uri="{91240B29-F687-4f45-9708-019B960494DF}">
-                <a14:hiddenLine xmlns="" xmlns:a14="http://schemas.microsoft.com/office/drawing/2010/main" w="9525">
+                <a14:hiddenLine xmlns:a14="http://schemas.microsoft.com/office/drawing/2010/main" xmlns="" w="9525">
                   <a:solidFill>
                     <a:srgbClr val="000000"/>
                   </a:solidFill>
@@ -3430,7 +3439,7 @@
             </a:ln>
             <a:extLst>
               <a:ext uri="{91240B29-F687-4f45-9708-019B960494DF}">
-                <a14:hiddenLine xmlns="" xmlns:a14="http://schemas.microsoft.com/office/drawing/2010/main" w="9525">
+                <a14:hiddenLine xmlns:a14="http://schemas.microsoft.com/office/drawing/2010/main" xmlns="" w="9525">
                   <a:solidFill>
                     <a:srgbClr val="000000"/>
                   </a:solidFill>
@@ -3520,7 +3529,7 @@
             </a:ln>
             <a:extLst>
               <a:ext uri="{91240B29-F687-4f45-9708-019B960494DF}">
-                <a14:hiddenLine xmlns="" xmlns:a14="http://schemas.microsoft.com/office/drawing/2010/main" w="9525">
+                <a14:hiddenLine xmlns:a14="http://schemas.microsoft.com/office/drawing/2010/main" xmlns="" w="9525">
                   <a:solidFill>
                     <a:srgbClr val="000000"/>
                   </a:solidFill>
@@ -3610,7 +3619,7 @@
             </a:ln>
             <a:extLst>
               <a:ext uri="{91240B29-F687-4f45-9708-019B960494DF}">
-                <a14:hiddenLine xmlns="" xmlns:a14="http://schemas.microsoft.com/office/drawing/2010/main" w="9525">
+                <a14:hiddenLine xmlns:a14="http://schemas.microsoft.com/office/drawing/2010/main" xmlns="" w="9525">
                   <a:solidFill>
                     <a:srgbClr val="000000"/>
                   </a:solidFill>
@@ -3675,7 +3684,7 @@
             </a:ln>
             <a:extLst>
               <a:ext uri="{91240B29-F687-4f45-9708-019B960494DF}">
-                <a14:hiddenLine xmlns="" xmlns:a14="http://schemas.microsoft.com/office/drawing/2010/main" w="9525">
+                <a14:hiddenLine xmlns:a14="http://schemas.microsoft.com/office/drawing/2010/main" xmlns="" w="9525">
                   <a:solidFill>
                     <a:srgbClr val="000000"/>
                   </a:solidFill>
@@ -3737,7 +3746,7 @@
             </a:ln>
             <a:extLst>
               <a:ext uri="{91240B29-F687-4f45-9708-019B960494DF}">
-                <a14:hiddenLine xmlns="" xmlns:a14="http://schemas.microsoft.com/office/drawing/2010/main" w="9525">
+                <a14:hiddenLine xmlns:a14="http://schemas.microsoft.com/office/drawing/2010/main" xmlns="" w="9525">
                   <a:solidFill>
                     <a:srgbClr val="000000"/>
                   </a:solidFill>
@@ -3827,7 +3836,7 @@
             </a:ln>
             <a:extLst>
               <a:ext uri="{91240B29-F687-4f45-9708-019B960494DF}">
-                <a14:hiddenLine xmlns="" xmlns:a14="http://schemas.microsoft.com/office/drawing/2010/main" w="9525">
+                <a14:hiddenLine xmlns:a14="http://schemas.microsoft.com/office/drawing/2010/main" xmlns="" w="9525">
                   <a:solidFill>
                     <a:srgbClr val="000000"/>
                   </a:solidFill>
@@ -3917,7 +3926,7 @@
             </a:ln>
             <a:extLst>
               <a:ext uri="{91240B29-F687-4f45-9708-019B960494DF}">
-                <a14:hiddenLine xmlns="" xmlns:a14="http://schemas.microsoft.com/office/drawing/2010/main" w="9525">
+                <a14:hiddenLine xmlns:a14="http://schemas.microsoft.com/office/drawing/2010/main" xmlns="" w="9525">
                   <a:solidFill>
                     <a:srgbClr val="000000"/>
                   </a:solidFill>
@@ -3979,7 +3988,7 @@
             </a:ln>
             <a:extLst>
               <a:ext uri="{91240B29-F687-4f45-9708-019B960494DF}">
-                <a14:hiddenLine xmlns="" xmlns:a14="http://schemas.microsoft.com/office/drawing/2010/main" w="9525">
+                <a14:hiddenLine xmlns:a14="http://schemas.microsoft.com/office/drawing/2010/main" xmlns="" w="9525">
                   <a:solidFill>
                     <a:srgbClr val="000000"/>
                   </a:solidFill>
@@ -4099,7 +4108,7 @@
             </a:ln>
             <a:extLst>
               <a:ext uri="{91240B29-F687-4f45-9708-019B960494DF}">
-                <a14:hiddenLine xmlns="" xmlns:a14="http://schemas.microsoft.com/office/drawing/2010/main" w="9525">
+                <a14:hiddenLine xmlns:a14="http://schemas.microsoft.com/office/drawing/2010/main" xmlns="" w="9525">
                   <a:solidFill>
                     <a:srgbClr val="000000"/>
                   </a:solidFill>
@@ -4167,7 +4176,7 @@
             </a:ln>
             <a:extLst>
               <a:ext uri="{91240B29-F687-4f45-9708-019B960494DF}">
-                <a14:hiddenLine xmlns="" xmlns:a14="http://schemas.microsoft.com/office/drawing/2010/main" w="9525">
+                <a14:hiddenLine xmlns:a14="http://schemas.microsoft.com/office/drawing/2010/main" xmlns="" w="9525">
                   <a:solidFill>
                     <a:srgbClr val="000000"/>
                   </a:solidFill>
@@ -4257,7 +4266,7 @@
             </a:ln>
             <a:extLst>
               <a:ext uri="{91240B29-F687-4f45-9708-019B960494DF}">
-                <a14:hiddenLine xmlns="" xmlns:a14="http://schemas.microsoft.com/office/drawing/2010/main" w="9525">
+                <a14:hiddenLine xmlns:a14="http://schemas.microsoft.com/office/drawing/2010/main" xmlns="" w="9525">
                   <a:solidFill>
                     <a:srgbClr val="000000"/>
                   </a:solidFill>
@@ -9064,7 +9073,7 @@
           <a:noFill/>
           <a:extLst>
             <a:ext uri="{909E8E84-426E-40dd-AFC4-6F175D3DCCD1}">
-              <a14:hiddenFill xmlns="" xmlns:a14="http://schemas.microsoft.com/office/drawing/2010/main">
+              <a14:hiddenFill xmlns:a14="http://schemas.microsoft.com/office/drawing/2010/main" xmlns="">
                 <a:solidFill>
                   <a:srgbClr val="FFFFFF"/>
                 </a:solidFill>
@@ -9138,7 +9147,7 @@
               </a:ln>
               <a:extLst>
                 <a:ext uri="{91240B29-F687-4f45-9708-019B960494DF}">
-                  <a14:hiddenLine xmlns="" xmlns:a14="http://schemas.microsoft.com/office/drawing/2010/main" w="9525">
+                  <a14:hiddenLine xmlns:a14="http://schemas.microsoft.com/office/drawing/2010/main" xmlns="" w="9525">
                     <a:solidFill>
                       <a:srgbClr val="000000"/>
                     </a:solidFill>
@@ -9228,7 +9237,7 @@
               </a:ln>
               <a:extLst>
                 <a:ext uri="{91240B29-F687-4f45-9708-019B960494DF}">
-                  <a14:hiddenLine xmlns="" xmlns:a14="http://schemas.microsoft.com/office/drawing/2010/main" w="9525">
+                  <a14:hiddenLine xmlns:a14="http://schemas.microsoft.com/office/drawing/2010/main" xmlns="" w="9525">
                     <a:solidFill>
                       <a:srgbClr val="000000"/>
                     </a:solidFill>
@@ -9318,7 +9327,7 @@
               </a:ln>
               <a:extLst>
                 <a:ext uri="{91240B29-F687-4f45-9708-019B960494DF}">
-                  <a14:hiddenLine xmlns="" xmlns:a14="http://schemas.microsoft.com/office/drawing/2010/main" w="9525">
+                  <a14:hiddenLine xmlns:a14="http://schemas.microsoft.com/office/drawing/2010/main" xmlns="" w="9525">
                     <a:solidFill>
                       <a:srgbClr val="000000"/>
                     </a:solidFill>
@@ -9380,7 +9389,7 @@
               </a:ln>
               <a:extLst>
                 <a:ext uri="{91240B29-F687-4f45-9708-019B960494DF}">
-                  <a14:hiddenLine xmlns="" xmlns:a14="http://schemas.microsoft.com/office/drawing/2010/main" w="9525">
+                  <a14:hiddenLine xmlns:a14="http://schemas.microsoft.com/office/drawing/2010/main" xmlns="" w="9525">
                     <a:solidFill>
                       <a:srgbClr val="000000"/>
                     </a:solidFill>
@@ -9470,7 +9479,7 @@
               </a:ln>
               <a:extLst>
                 <a:ext uri="{91240B29-F687-4f45-9708-019B960494DF}">
-                  <a14:hiddenLine xmlns="" xmlns:a14="http://schemas.microsoft.com/office/drawing/2010/main" w="9525">
+                  <a14:hiddenLine xmlns:a14="http://schemas.microsoft.com/office/drawing/2010/main" xmlns="" w="9525">
                     <a:solidFill>
                       <a:srgbClr val="000000"/>
                     </a:solidFill>
@@ -9532,7 +9541,7 @@
               </a:ln>
               <a:extLst>
                 <a:ext uri="{91240B29-F687-4f45-9708-019B960494DF}">
-                  <a14:hiddenLine xmlns="" xmlns:a14="http://schemas.microsoft.com/office/drawing/2010/main" w="9525">
+                  <a14:hiddenLine xmlns:a14="http://schemas.microsoft.com/office/drawing/2010/main" xmlns="" w="9525">
                     <a:solidFill>
                       <a:srgbClr val="000000"/>
                     </a:solidFill>
@@ -9594,7 +9603,7 @@
               </a:ln>
               <a:extLst>
                 <a:ext uri="{91240B29-F687-4f45-9708-019B960494DF}">
-                  <a14:hiddenLine xmlns="" xmlns:a14="http://schemas.microsoft.com/office/drawing/2010/main" w="9525">
+                  <a14:hiddenLine xmlns:a14="http://schemas.microsoft.com/office/drawing/2010/main" xmlns="" w="9525">
                     <a:solidFill>
                       <a:srgbClr val="000000"/>
                     </a:solidFill>
@@ -9684,7 +9693,7 @@
               </a:ln>
               <a:extLst>
                 <a:ext uri="{91240B29-F687-4f45-9708-019B960494DF}">
-                  <a14:hiddenLine xmlns="" xmlns:a14="http://schemas.microsoft.com/office/drawing/2010/main" w="9525">
+                  <a14:hiddenLine xmlns:a14="http://schemas.microsoft.com/office/drawing/2010/main" xmlns="" w="9525">
                     <a:solidFill>
                       <a:srgbClr val="000000"/>
                     </a:solidFill>
@@ -9774,7 +9783,7 @@
               </a:ln>
               <a:extLst>
                 <a:ext uri="{91240B29-F687-4f45-9708-019B960494DF}">
-                  <a14:hiddenLine xmlns="" xmlns:a14="http://schemas.microsoft.com/office/drawing/2010/main" w="9525">
+                  <a14:hiddenLine xmlns:a14="http://schemas.microsoft.com/office/drawing/2010/main" xmlns="" w="9525">
                     <a:solidFill>
                       <a:srgbClr val="000000"/>
                     </a:solidFill>
@@ -9836,7 +9845,7 @@
               </a:ln>
               <a:extLst>
                 <a:ext uri="{91240B29-F687-4f45-9708-019B960494DF}">
-                  <a14:hiddenLine xmlns="" xmlns:a14="http://schemas.microsoft.com/office/drawing/2010/main" w="9525">
+                  <a14:hiddenLine xmlns:a14="http://schemas.microsoft.com/office/drawing/2010/main" xmlns="" w="9525">
                     <a:solidFill>
                       <a:srgbClr val="000000"/>
                     </a:solidFill>
@@ -9946,7 +9955,7 @@
               </a:ln>
               <a:extLst>
                 <a:ext uri="{91240B29-F687-4f45-9708-019B960494DF}">
-                  <a14:hiddenLine xmlns="" xmlns:a14="http://schemas.microsoft.com/office/drawing/2010/main" w="9525">
+                  <a14:hiddenLine xmlns:a14="http://schemas.microsoft.com/office/drawing/2010/main" xmlns="" w="9525">
                     <a:solidFill>
                       <a:srgbClr val="000000"/>
                     </a:solidFill>
@@ -10030,7 +10039,7 @@
               </a:ln>
               <a:extLst>
                 <a:ext uri="{91240B29-F687-4f45-9708-019B960494DF}">
-                  <a14:hiddenLine xmlns="" xmlns:a14="http://schemas.microsoft.com/office/drawing/2010/main" w="9525">
+                  <a14:hiddenLine xmlns:a14="http://schemas.microsoft.com/office/drawing/2010/main" xmlns="" w="9525">
                     <a:solidFill>
                       <a:srgbClr val="000000"/>
                     </a:solidFill>
@@ -10092,7 +10101,7 @@
               </a:ln>
               <a:extLst>
                 <a:ext uri="{91240B29-F687-4f45-9708-019B960494DF}">
-                  <a14:hiddenLine xmlns="" xmlns:a14="http://schemas.microsoft.com/office/drawing/2010/main" w="9525">
+                  <a14:hiddenLine xmlns:a14="http://schemas.microsoft.com/office/drawing/2010/main" xmlns="" w="9525">
                     <a:solidFill>
                       <a:srgbClr val="000000"/>
                     </a:solidFill>
@@ -10154,7 +10163,7 @@
               </a:ln>
               <a:extLst>
                 <a:ext uri="{91240B29-F687-4f45-9708-019B960494DF}">
-                  <a14:hiddenLine xmlns="" xmlns:a14="http://schemas.microsoft.com/office/drawing/2010/main" w="9525">
+                  <a14:hiddenLine xmlns:a14="http://schemas.microsoft.com/office/drawing/2010/main" xmlns="" w="9525">
                     <a:solidFill>
                       <a:srgbClr val="000000"/>
                     </a:solidFill>
@@ -10244,7 +10253,7 @@
               </a:ln>
               <a:extLst>
                 <a:ext uri="{91240B29-F687-4f45-9708-019B960494DF}">
-                  <a14:hiddenLine xmlns="" xmlns:a14="http://schemas.microsoft.com/office/drawing/2010/main" w="9525">
+                  <a14:hiddenLine xmlns:a14="http://schemas.microsoft.com/office/drawing/2010/main" xmlns="" w="9525">
                     <a:solidFill>
                       <a:srgbClr val="000000"/>
                     </a:solidFill>
@@ -10278,7 +10287,7 @@
               </a:ln>
               <a:extLst>
                 <a:ext uri="{91240B29-F687-4f45-9708-019B960494DF}">
-                  <a14:hiddenLine xmlns="" xmlns:a14="http://schemas.microsoft.com/office/drawing/2010/main" w="9525">
+                  <a14:hiddenLine xmlns:a14="http://schemas.microsoft.com/office/drawing/2010/main" xmlns="" w="9525">
                     <a:solidFill>
                       <a:srgbClr val="000000"/>
                     </a:solidFill>
@@ -10343,7 +10352,7 @@
               </a:ln>
               <a:extLst>
                 <a:ext uri="{91240B29-F687-4f45-9708-019B960494DF}">
-                  <a14:hiddenLine xmlns="" xmlns:a14="http://schemas.microsoft.com/office/drawing/2010/main" w="9525">
+                  <a14:hiddenLine xmlns:a14="http://schemas.microsoft.com/office/drawing/2010/main" xmlns="" w="9525">
                     <a:solidFill>
                       <a:srgbClr val="000000"/>
                     </a:solidFill>
@@ -10433,7 +10442,7 @@
               </a:ln>
               <a:extLst>
                 <a:ext uri="{91240B29-F687-4f45-9708-019B960494DF}">
-                  <a14:hiddenLine xmlns="" xmlns:a14="http://schemas.microsoft.com/office/drawing/2010/main" w="9525">
+                  <a14:hiddenLine xmlns:a14="http://schemas.microsoft.com/office/drawing/2010/main" xmlns="" w="9525">
                     <a:solidFill>
                       <a:srgbClr val="000000"/>
                     </a:solidFill>
@@ -10495,7 +10504,7 @@
               </a:ln>
               <a:extLst>
                 <a:ext uri="{91240B29-F687-4f45-9708-019B960494DF}">
-                  <a14:hiddenLine xmlns="" xmlns:a14="http://schemas.microsoft.com/office/drawing/2010/main" w="9525">
+                  <a14:hiddenLine xmlns:a14="http://schemas.microsoft.com/office/drawing/2010/main" xmlns="" w="9525">
                     <a:solidFill>
                       <a:srgbClr val="000000"/>
                     </a:solidFill>
@@ -10585,7 +10594,7 @@
               </a:ln>
               <a:extLst>
                 <a:ext uri="{91240B29-F687-4f45-9708-019B960494DF}">
-                  <a14:hiddenLine xmlns="" xmlns:a14="http://schemas.microsoft.com/office/drawing/2010/main" w="9525">
+                  <a14:hiddenLine xmlns:a14="http://schemas.microsoft.com/office/drawing/2010/main" xmlns="" w="9525">
                     <a:solidFill>
                       <a:srgbClr val="000000"/>
                     </a:solidFill>
@@ -10650,7 +10659,7 @@
               </a:ln>
               <a:extLst>
                 <a:ext uri="{91240B29-F687-4f45-9708-019B960494DF}">
-                  <a14:hiddenLine xmlns="" xmlns:a14="http://schemas.microsoft.com/office/drawing/2010/main" w="9525">
+                  <a14:hiddenLine xmlns:a14="http://schemas.microsoft.com/office/drawing/2010/main" xmlns="" w="9525">
                     <a:solidFill>
                       <a:srgbClr val="000000"/>
                     </a:solidFill>
@@ -10712,7 +10721,7 @@
               </a:ln>
               <a:extLst>
                 <a:ext uri="{91240B29-F687-4f45-9708-019B960494DF}">
-                  <a14:hiddenLine xmlns="" xmlns:a14="http://schemas.microsoft.com/office/drawing/2010/main" w="9525">
+                  <a14:hiddenLine xmlns:a14="http://schemas.microsoft.com/office/drawing/2010/main" xmlns="" w="9525">
                     <a:solidFill>
                       <a:srgbClr val="000000"/>
                     </a:solidFill>
@@ -10802,7 +10811,7 @@
               </a:ln>
               <a:extLst>
                 <a:ext uri="{91240B29-F687-4f45-9708-019B960494DF}">
-                  <a14:hiddenLine xmlns="" xmlns:a14="http://schemas.microsoft.com/office/drawing/2010/main" w="9525">
+                  <a14:hiddenLine xmlns:a14="http://schemas.microsoft.com/office/drawing/2010/main" xmlns="" w="9525">
                     <a:solidFill>
                       <a:srgbClr val="000000"/>
                     </a:solidFill>
@@ -10892,7 +10901,7 @@
               </a:ln>
               <a:extLst>
                 <a:ext uri="{91240B29-F687-4f45-9708-019B960494DF}">
-                  <a14:hiddenLine xmlns="" xmlns:a14="http://schemas.microsoft.com/office/drawing/2010/main" w="9525">
+                  <a14:hiddenLine xmlns:a14="http://schemas.microsoft.com/office/drawing/2010/main" xmlns="" w="9525">
                     <a:solidFill>
                       <a:srgbClr val="000000"/>
                     </a:solidFill>
@@ -10957,7 +10966,7 @@
               </a:ln>
               <a:extLst>
                 <a:ext uri="{91240B29-F687-4f45-9708-019B960494DF}">
-                  <a14:hiddenLine xmlns="" xmlns:a14="http://schemas.microsoft.com/office/drawing/2010/main" w="9525">
+                  <a14:hiddenLine xmlns:a14="http://schemas.microsoft.com/office/drawing/2010/main" xmlns="" w="9525">
                     <a:solidFill>
                       <a:srgbClr val="000000"/>
                     </a:solidFill>
@@ -11077,7 +11086,7 @@
               </a:ln>
               <a:extLst>
                 <a:ext uri="{91240B29-F687-4f45-9708-019B960494DF}">
-                  <a14:hiddenLine xmlns="" xmlns:a14="http://schemas.microsoft.com/office/drawing/2010/main" w="9525">
+                  <a14:hiddenLine xmlns:a14="http://schemas.microsoft.com/office/drawing/2010/main" xmlns="" w="9525">
                     <a:solidFill>
                       <a:srgbClr val="000000"/>
                     </a:solidFill>
@@ -11175,7 +11184,7 @@
               </a:ln>
               <a:extLst>
                 <a:ext uri="{91240B29-F687-4f45-9708-019B960494DF}">
-                  <a14:hiddenLine xmlns="" xmlns:a14="http://schemas.microsoft.com/office/drawing/2010/main" w="9525">
+                  <a14:hiddenLine xmlns:a14="http://schemas.microsoft.com/office/drawing/2010/main" xmlns="" w="9525">
                     <a:solidFill>
                       <a:srgbClr val="000000"/>
                     </a:solidFill>
@@ -11290,7 +11299,7 @@
               </a:ln>
               <a:extLst>
                 <a:ext uri="{91240B29-F687-4f45-9708-019B960494DF}">
-                  <a14:hiddenLine xmlns="" xmlns:a14="http://schemas.microsoft.com/office/drawing/2010/main" w="9525">
+                  <a14:hiddenLine xmlns:a14="http://schemas.microsoft.com/office/drawing/2010/main" xmlns="" w="9525">
                     <a:solidFill>
                       <a:srgbClr val="000000"/>
                     </a:solidFill>
@@ -11380,7 +11389,7 @@
               </a:ln>
               <a:extLst>
                 <a:ext uri="{91240B29-F687-4f45-9708-019B960494DF}">
-                  <a14:hiddenLine xmlns="" xmlns:a14="http://schemas.microsoft.com/office/drawing/2010/main" w="9525">
+                  <a14:hiddenLine xmlns:a14="http://schemas.microsoft.com/office/drawing/2010/main" xmlns="" w="9525">
                     <a:solidFill>
                       <a:srgbClr val="000000"/>
                     </a:solidFill>
@@ -11445,7 +11454,7 @@
               </a:ln>
               <a:extLst>
                 <a:ext uri="{91240B29-F687-4f45-9708-019B960494DF}">
-                  <a14:hiddenLine xmlns="" xmlns:a14="http://schemas.microsoft.com/office/drawing/2010/main" w="9525">
+                  <a14:hiddenLine xmlns:a14="http://schemas.microsoft.com/office/drawing/2010/main" xmlns="" w="9525">
                     <a:solidFill>
                       <a:srgbClr val="000000"/>
                     </a:solidFill>
@@ -11535,7 +11544,7 @@
               </a:ln>
               <a:extLst>
                 <a:ext uri="{91240B29-F687-4f45-9708-019B960494DF}">
-                  <a14:hiddenLine xmlns="" xmlns:a14="http://schemas.microsoft.com/office/drawing/2010/main" w="9525">
+                  <a14:hiddenLine xmlns:a14="http://schemas.microsoft.com/office/drawing/2010/main" xmlns="" w="9525">
                     <a:solidFill>
                       <a:srgbClr val="000000"/>
                     </a:solidFill>
@@ -11603,7 +11612,7 @@
               </a:ln>
               <a:extLst>
                 <a:ext uri="{91240B29-F687-4f45-9708-019B960494DF}">
-                  <a14:hiddenLine xmlns="" xmlns:a14="http://schemas.microsoft.com/office/drawing/2010/main" w="9525">
+                  <a14:hiddenLine xmlns:a14="http://schemas.microsoft.com/office/drawing/2010/main" xmlns="" w="9525">
                     <a:solidFill>
                       <a:srgbClr val="000000"/>
                     </a:solidFill>
@@ -11693,7 +11702,7 @@
               </a:ln>
               <a:extLst>
                 <a:ext uri="{91240B29-F687-4f45-9708-019B960494DF}">
-                  <a14:hiddenLine xmlns="" xmlns:a14="http://schemas.microsoft.com/office/drawing/2010/main" w="9525">
+                  <a14:hiddenLine xmlns:a14="http://schemas.microsoft.com/office/drawing/2010/main" xmlns="" w="9525">
                     <a:solidFill>
                       <a:srgbClr val="000000"/>
                     </a:solidFill>
@@ -11761,7 +11770,7 @@
               </a:ln>
               <a:extLst>
                 <a:ext uri="{91240B29-F687-4f45-9708-019B960494DF}">
-                  <a14:hiddenLine xmlns="" xmlns:a14="http://schemas.microsoft.com/office/drawing/2010/main" w="9525">
+                  <a14:hiddenLine xmlns:a14="http://schemas.microsoft.com/office/drawing/2010/main" xmlns="" w="9525">
                     <a:solidFill>
                       <a:srgbClr val="000000"/>
                     </a:solidFill>
@@ -11851,7 +11860,7 @@
               </a:ln>
               <a:extLst>
                 <a:ext uri="{91240B29-F687-4f45-9708-019B960494DF}">
-                  <a14:hiddenLine xmlns="" xmlns:a14="http://schemas.microsoft.com/office/drawing/2010/main" w="9525">
+                  <a14:hiddenLine xmlns:a14="http://schemas.microsoft.com/office/drawing/2010/main" xmlns="" w="9525">
                     <a:solidFill>
                       <a:srgbClr val="000000"/>
                     </a:solidFill>
@@ -11885,7 +11894,7 @@
               </a:ln>
               <a:extLst>
                 <a:ext uri="{91240B29-F687-4f45-9708-019B960494DF}">
-                  <a14:hiddenLine xmlns="" xmlns:a14="http://schemas.microsoft.com/office/drawing/2010/main" w="9525">
+                  <a14:hiddenLine xmlns:a14="http://schemas.microsoft.com/office/drawing/2010/main" xmlns="" w="9525">
                     <a:solidFill>
                       <a:srgbClr val="000000"/>
                     </a:solidFill>
@@ -12617,6 +12626,1002 @@
 </p:sld>
 </file>
 
+<file path=ppt/slides/slide11.xml><?xml version="1.0" encoding="utf-8"?>
+<p:sld xmlns:a="http://schemas.openxmlformats.org/drawingml/2006/main" xmlns:r="http://schemas.openxmlformats.org/officeDocument/2006/relationships" xmlns:p="http://schemas.openxmlformats.org/presentationml/2006/main">
+  <p:cSld>
+    <p:spTree>
+      <p:nvGrpSpPr>
+        <p:cNvPr id="1" name=""/>
+        <p:cNvGrpSpPr/>
+        <p:nvPr/>
+      </p:nvGrpSpPr>
+      <p:grpSpPr>
+        <a:xfrm>
+          <a:off x="0" y="0"/>
+          <a:ext cx="0" cy="0"/>
+          <a:chOff x="0" y="0"/>
+          <a:chExt cx="0" cy="0"/>
+        </a:xfrm>
+      </p:grpSpPr>
+      <p:sp>
+        <p:nvSpPr>
+          <p:cNvPr id="2" name="Title 1"/>
+          <p:cNvSpPr>
+            <a:spLocks noGrp="1"/>
+          </p:cNvSpPr>
+          <p:nvPr>
+            <p:ph type="title"/>
+          </p:nvPr>
+        </p:nvSpPr>
+        <p:spPr/>
+        <p:txBody>
+          <a:bodyPr/>
+          <a:lstStyle/>
+          <a:p>
+            <a:pPr algn="ctr"/>
+            <a:r>
+              <a:rPr lang="bg-BG" dirty="0" smtClean="0"/>
+              <a:t>Създаване на изключения</a:t>
+            </a:r>
+            <a:endParaRPr lang="en-US" dirty="0"/>
+          </a:p>
+        </p:txBody>
+      </p:sp>
+      <p:sp>
+        <p:nvSpPr>
+          <p:cNvPr id="3" name="Content Placeholder 2"/>
+          <p:cNvSpPr>
+            <a:spLocks noGrp="1"/>
+          </p:cNvSpPr>
+          <p:nvPr>
+            <p:ph idx="1"/>
+          </p:nvPr>
+        </p:nvSpPr>
+        <p:spPr/>
+        <p:txBody>
+          <a:bodyPr/>
+          <a:lstStyle/>
+          <a:p>
+            <a:r>
+              <a:rPr lang="bg-BG" dirty="0" smtClean="0"/>
+              <a:t>Изключенията представляват правилният начин да се </a:t>
+            </a:r>
+            <a:r>
+              <a:rPr lang="bg-BG" dirty="0" err="1" smtClean="0"/>
+              <a:t>индикира</a:t>
+            </a:r>
+            <a:r>
+              <a:rPr lang="bg-BG" dirty="0" smtClean="0"/>
+              <a:t> за възникнала грешка</a:t>
+            </a:r>
+            <a:endParaRPr lang="en-US" dirty="0" smtClean="0"/>
+          </a:p>
+          <a:p>
+            <a:r>
+              <a:rPr lang="bg-BG" dirty="0" smtClean="0"/>
+              <a:t>Изключения могат се създават посредством ключовата дума </a:t>
+            </a:r>
+            <a:r>
+              <a:rPr lang="en-US" dirty="0" smtClean="0"/>
+              <a:t>throw </a:t>
+            </a:r>
+            <a:r>
+              <a:rPr lang="bg-BG" dirty="0" smtClean="0"/>
+              <a:t>последвана от инстанция на клас наследник на </a:t>
+            </a:r>
+            <a:r>
+              <a:rPr lang="en-US" dirty="0" smtClean="0"/>
+              <a:t>Exception</a:t>
+            </a:r>
+            <a:endParaRPr lang="bg-BG" dirty="0" smtClean="0"/>
+          </a:p>
+          <a:p>
+            <a:pPr marL="0" indent="0">
+              <a:buNone/>
+            </a:pPr>
+            <a:endParaRPr lang="en-US" dirty="0"/>
+          </a:p>
+        </p:txBody>
+      </p:sp>
+    </p:spTree>
+    <p:extLst>
+      <p:ext uri="{BB962C8B-B14F-4D97-AF65-F5344CB8AC3E}">
+        <p14:creationId xmlns:p14="http://schemas.microsoft.com/office/powerpoint/2010/main" val="3653267537"/>
+      </p:ext>
+    </p:extLst>
+  </p:cSld>
+  <p:clrMapOvr>
+    <a:masterClrMapping/>
+  </p:clrMapOvr>
+</p:sld>
+</file>
+
+<file path=ppt/slides/slide12.xml><?xml version="1.0" encoding="utf-8"?>
+<p:sld xmlns:a="http://schemas.openxmlformats.org/drawingml/2006/main" xmlns:r="http://schemas.openxmlformats.org/officeDocument/2006/relationships" xmlns:p="http://schemas.openxmlformats.org/presentationml/2006/main">
+  <p:cSld>
+    <p:spTree>
+      <p:nvGrpSpPr>
+        <p:cNvPr id="1" name=""/>
+        <p:cNvGrpSpPr/>
+        <p:nvPr/>
+      </p:nvGrpSpPr>
+      <p:grpSpPr>
+        <a:xfrm>
+          <a:off x="0" y="0"/>
+          <a:ext cx="0" cy="0"/>
+          <a:chOff x="0" y="0"/>
+          <a:chExt cx="0" cy="0"/>
+        </a:xfrm>
+      </p:grpSpPr>
+      <p:sp>
+        <p:nvSpPr>
+          <p:cNvPr id="2" name="Title 1"/>
+          <p:cNvSpPr>
+            <a:spLocks noGrp="1"/>
+          </p:cNvSpPr>
+          <p:nvPr>
+            <p:ph type="title"/>
+          </p:nvPr>
+        </p:nvSpPr>
+        <p:spPr/>
+        <p:txBody>
+          <a:bodyPr/>
+          <a:lstStyle/>
+          <a:p>
+            <a:pPr algn="ctr"/>
+            <a:r>
+              <a:rPr lang="bg-BG" dirty="0"/>
+              <a:t>Създаване на </a:t>
+            </a:r>
+            <a:r>
+              <a:rPr lang="bg-BG" dirty="0" smtClean="0"/>
+              <a:t>изключения</a:t>
+            </a:r>
+            <a:r>
+              <a:rPr lang="en-US" dirty="0" smtClean="0"/>
+              <a:t> </a:t>
+            </a:r>
+            <a:r>
+              <a:rPr lang="bg-BG" dirty="0" smtClean="0"/>
+              <a:t>демо</a:t>
+            </a:r>
+            <a:endParaRPr lang="en-US" dirty="0"/>
+          </a:p>
+        </p:txBody>
+      </p:sp>
+      <p:pic>
+        <p:nvPicPr>
+          <p:cNvPr id="1026" name="Picture 2" descr="http://katenasser.com/wp-content/uploads/iStock_000011704260XSmallRedCarpetShortcut.jpg"/>
+          <p:cNvPicPr>
+            <a:picLocks noChangeAspect="1" noChangeArrowheads="1"/>
+          </p:cNvPicPr>
+          <p:nvPr/>
+        </p:nvPicPr>
+        <p:blipFill>
+          <a:blip r:embed="rId2">
+            <a:extLst>
+              <a:ext uri="{28A0092B-C50C-407E-A947-70E740481C1C}">
+                <a14:useLocalDpi xmlns:a14="http://schemas.microsoft.com/office/drawing/2010/main" val="0"/>
+              </a:ext>
+            </a:extLst>
+          </a:blip>
+          <a:srcRect/>
+          <a:stretch>
+            <a:fillRect/>
+          </a:stretch>
+        </p:blipFill>
+        <p:spPr bwMode="auto">
+          <a:xfrm>
+            <a:off x="3968577" y="2097088"/>
+            <a:ext cx="4251669" cy="4338438"/>
+          </a:xfrm>
+          <a:prstGeom prst="rect">
+            <a:avLst/>
+          </a:prstGeom>
+          <a:noFill/>
+          <a:extLst>
+            <a:ext uri="{909E8E84-426E-40DD-AFC4-6F175D3DCCD1}">
+              <a14:hiddenFill xmlns:a14="http://schemas.microsoft.com/office/drawing/2010/main">
+                <a:solidFill>
+                  <a:srgbClr val="FFFFFF"/>
+                </a:solidFill>
+              </a14:hiddenFill>
+            </a:ext>
+          </a:extLst>
+        </p:spPr>
+      </p:pic>
+    </p:spTree>
+    <p:extLst>
+      <p:ext uri="{BB962C8B-B14F-4D97-AF65-F5344CB8AC3E}">
+        <p14:creationId xmlns:p14="http://schemas.microsoft.com/office/powerpoint/2010/main" val="2347589490"/>
+      </p:ext>
+    </p:extLst>
+  </p:cSld>
+  <p:clrMapOvr>
+    <a:masterClrMapping/>
+  </p:clrMapOvr>
+</p:sld>
+</file>
+
+<file path=ppt/slides/slide13.xml><?xml version="1.0" encoding="utf-8"?>
+<p:sld xmlns:a="http://schemas.openxmlformats.org/drawingml/2006/main" xmlns:r="http://schemas.openxmlformats.org/officeDocument/2006/relationships" xmlns:p="http://schemas.openxmlformats.org/presentationml/2006/main">
+  <p:cSld>
+    <p:spTree>
+      <p:nvGrpSpPr>
+        <p:cNvPr id="1" name=""/>
+        <p:cNvGrpSpPr/>
+        <p:nvPr/>
+      </p:nvGrpSpPr>
+      <p:grpSpPr>
+        <a:xfrm>
+          <a:off x="0" y="0"/>
+          <a:ext cx="0" cy="0"/>
+          <a:chOff x="0" y="0"/>
+          <a:chExt cx="0" cy="0"/>
+        </a:xfrm>
+      </p:grpSpPr>
+      <p:sp>
+        <p:nvSpPr>
+          <p:cNvPr id="2" name="Title 1"/>
+          <p:cNvSpPr>
+            <a:spLocks noGrp="1"/>
+          </p:cNvSpPr>
+          <p:nvPr>
+            <p:ph type="title"/>
+          </p:nvPr>
+        </p:nvSpPr>
+        <p:spPr/>
+        <p:txBody>
+          <a:bodyPr/>
+          <a:lstStyle/>
+          <a:p>
+            <a:pPr algn="ctr"/>
+            <a:r>
+              <a:rPr lang="bg-BG" dirty="0" smtClean="0"/>
+              <a:t>Задача</a:t>
+            </a:r>
+            <a:endParaRPr lang="en-US" dirty="0"/>
+          </a:p>
+        </p:txBody>
+      </p:sp>
+      <p:sp>
+        <p:nvSpPr>
+          <p:cNvPr id="3" name="Content Placeholder 2"/>
+          <p:cNvSpPr>
+            <a:spLocks noGrp="1"/>
+          </p:cNvSpPr>
+          <p:nvPr>
+            <p:ph idx="1"/>
+          </p:nvPr>
+        </p:nvSpPr>
+        <p:spPr/>
+        <p:txBody>
+          <a:bodyPr>
+            <a:normAutofit lnSpcReduction="10000"/>
+          </a:bodyPr>
+          <a:lstStyle/>
+          <a:p>
+            <a:r>
+              <a:rPr lang="bg-BG" dirty="0" smtClean="0"/>
+              <a:t>Направете клас за потребител съдържащ полета за </a:t>
+            </a:r>
+            <a:r>
+              <a:rPr lang="en-US" dirty="0" smtClean="0"/>
+              <a:t>e-mail </a:t>
+            </a:r>
+            <a:r>
+              <a:rPr lang="bg-BG" dirty="0" smtClean="0"/>
+              <a:t>и парола.</a:t>
+            </a:r>
+          </a:p>
+          <a:p>
+            <a:pPr marL="0" indent="0">
+              <a:buNone/>
+            </a:pPr>
+            <a:r>
+              <a:rPr lang="bg-BG" dirty="0" smtClean="0"/>
+              <a:t>Направете валидация за двете полета, като при намиране на невалидни данни създавайте изключения:</a:t>
+            </a:r>
+          </a:p>
+          <a:p>
+            <a:pPr marL="0" indent="0">
+              <a:buNone/>
+            </a:pPr>
+            <a:r>
+              <a:rPr lang="bg-BG" dirty="0" smtClean="0"/>
+              <a:t>Валиден </a:t>
+            </a:r>
+            <a:r>
+              <a:rPr lang="en-US" dirty="0" smtClean="0"/>
+              <a:t>e-mail: </a:t>
+            </a:r>
+            <a:r>
+              <a:rPr lang="bg-BG" dirty="0" smtClean="0"/>
+              <a:t>над 5 символа, съдържа @ и .</a:t>
+            </a:r>
+          </a:p>
+          <a:p>
+            <a:pPr marL="0" indent="0">
+              <a:buNone/>
+            </a:pPr>
+            <a:r>
+              <a:rPr lang="bg-BG" dirty="0" smtClean="0"/>
+              <a:t>Валидна парола: съдържа минимум 6 символа и поне една цифра</a:t>
+            </a:r>
+          </a:p>
+          <a:p>
+            <a:pPr marL="0" indent="0">
+              <a:buNone/>
+            </a:pPr>
+            <a:r>
+              <a:rPr lang="bg-BG" dirty="0" smtClean="0"/>
+              <a:t>Създайте програма, която приема данни за 3 потребителя и обработва коректно възможните изключения</a:t>
+            </a:r>
+            <a:endParaRPr lang="en-US" dirty="0"/>
+          </a:p>
+        </p:txBody>
+      </p:sp>
+    </p:spTree>
+    <p:extLst>
+      <p:ext uri="{BB962C8B-B14F-4D97-AF65-F5344CB8AC3E}">
+        <p14:creationId xmlns:p14="http://schemas.microsoft.com/office/powerpoint/2010/main" val="1978310116"/>
+      </p:ext>
+    </p:extLst>
+  </p:cSld>
+  <p:clrMapOvr>
+    <a:masterClrMapping/>
+  </p:clrMapOvr>
+</p:sld>
+</file>
+
+<file path=ppt/slides/slide14.xml><?xml version="1.0" encoding="utf-8"?>
+<p:sld xmlns:a="http://schemas.openxmlformats.org/drawingml/2006/main" xmlns:r="http://schemas.openxmlformats.org/officeDocument/2006/relationships" xmlns:p="http://schemas.openxmlformats.org/presentationml/2006/main">
+  <p:cSld>
+    <p:spTree>
+      <p:nvGrpSpPr>
+        <p:cNvPr id="1" name=""/>
+        <p:cNvGrpSpPr/>
+        <p:nvPr/>
+      </p:nvGrpSpPr>
+      <p:grpSpPr>
+        <a:xfrm>
+          <a:off x="0" y="0"/>
+          <a:ext cx="0" cy="0"/>
+          <a:chOff x="0" y="0"/>
+          <a:chExt cx="0" cy="0"/>
+        </a:xfrm>
+      </p:grpSpPr>
+      <p:sp>
+        <p:nvSpPr>
+          <p:cNvPr id="2" name="Title 1"/>
+          <p:cNvSpPr>
+            <a:spLocks noGrp="1"/>
+          </p:cNvSpPr>
+          <p:nvPr>
+            <p:ph type="title"/>
+          </p:nvPr>
+        </p:nvSpPr>
+        <p:spPr/>
+        <p:txBody>
+          <a:bodyPr/>
+          <a:lstStyle/>
+          <a:p>
+            <a:pPr algn="ctr"/>
+            <a:r>
+              <a:rPr lang="bg-BG" dirty="0" smtClean="0"/>
+              <a:t>Дефиниране на изключения</a:t>
+            </a:r>
+            <a:endParaRPr lang="en-US" dirty="0"/>
+          </a:p>
+        </p:txBody>
+      </p:sp>
+      <p:sp>
+        <p:nvSpPr>
+          <p:cNvPr id="3" name="Content Placeholder 2"/>
+          <p:cNvSpPr>
+            <a:spLocks noGrp="1"/>
+          </p:cNvSpPr>
+          <p:nvPr>
+            <p:ph idx="1"/>
+          </p:nvPr>
+        </p:nvSpPr>
+        <p:spPr/>
+        <p:txBody>
+          <a:bodyPr/>
+          <a:lstStyle/>
+          <a:p>
+            <a:r>
+              <a:rPr lang="bg-BG" dirty="0" smtClean="0"/>
+              <a:t>Изключенията представляват обекти, които са </a:t>
+            </a:r>
+            <a:r>
+              <a:rPr lang="bg-BG" dirty="0" err="1" smtClean="0"/>
+              <a:t>инстанцирани</a:t>
+            </a:r>
+            <a:r>
+              <a:rPr lang="bg-BG" dirty="0" smtClean="0"/>
+              <a:t> от класове наследници на базовият клас </a:t>
+            </a:r>
+            <a:r>
+              <a:rPr lang="en-US" dirty="0" smtClean="0"/>
+              <a:t>Exception</a:t>
+            </a:r>
+            <a:endParaRPr lang="bg-BG" dirty="0" smtClean="0"/>
+          </a:p>
+          <a:p>
+            <a:r>
+              <a:rPr lang="bg-BG" dirty="0" smtClean="0"/>
+              <a:t>Добра практика при изграждането на операции да се дефинират изключения със собствен тип</a:t>
+            </a:r>
+            <a:endParaRPr lang="en-US" dirty="0" smtClean="0"/>
+          </a:p>
+          <a:p>
+            <a:r>
+              <a:rPr lang="bg-BG" dirty="0" smtClean="0"/>
+              <a:t>Когато една функция може да породи изключение от определен тип това трябва да бъде описано в нейната сигнатура</a:t>
+            </a:r>
+            <a:endParaRPr lang="en-US" dirty="0"/>
+          </a:p>
+        </p:txBody>
+      </p:sp>
+    </p:spTree>
+    <p:extLst>
+      <p:ext uri="{BB962C8B-B14F-4D97-AF65-F5344CB8AC3E}">
+        <p14:creationId xmlns:p14="http://schemas.microsoft.com/office/powerpoint/2010/main" val="3393745851"/>
+      </p:ext>
+    </p:extLst>
+  </p:cSld>
+  <p:clrMapOvr>
+    <a:masterClrMapping/>
+  </p:clrMapOvr>
+</p:sld>
+</file>
+
+<file path=ppt/slides/slide15.xml><?xml version="1.0" encoding="utf-8"?>
+<p:sld xmlns:a="http://schemas.openxmlformats.org/drawingml/2006/main" xmlns:r="http://schemas.openxmlformats.org/officeDocument/2006/relationships" xmlns:p="http://schemas.openxmlformats.org/presentationml/2006/main">
+  <p:cSld>
+    <p:spTree>
+      <p:nvGrpSpPr>
+        <p:cNvPr id="1" name=""/>
+        <p:cNvGrpSpPr/>
+        <p:nvPr/>
+      </p:nvGrpSpPr>
+      <p:grpSpPr>
+        <a:xfrm>
+          <a:off x="0" y="0"/>
+          <a:ext cx="0" cy="0"/>
+          <a:chOff x="0" y="0"/>
+          <a:chExt cx="0" cy="0"/>
+        </a:xfrm>
+      </p:grpSpPr>
+      <p:sp>
+        <p:nvSpPr>
+          <p:cNvPr id="2" name="Title 1"/>
+          <p:cNvSpPr>
+            <a:spLocks noGrp="1"/>
+          </p:cNvSpPr>
+          <p:nvPr>
+            <p:ph type="title"/>
+          </p:nvPr>
+        </p:nvSpPr>
+        <p:spPr/>
+        <p:txBody>
+          <a:bodyPr/>
+          <a:lstStyle/>
+          <a:p>
+            <a:pPr algn="ctr"/>
+            <a:r>
+              <a:rPr lang="bg-BG" dirty="0"/>
+              <a:t>Дефиниране на </a:t>
+            </a:r>
+            <a:r>
+              <a:rPr lang="bg-BG" dirty="0" smtClean="0"/>
+              <a:t>изключения</a:t>
+            </a:r>
+            <a:r>
+              <a:rPr lang="en-US" dirty="0" smtClean="0"/>
+              <a:t> </a:t>
+            </a:r>
+            <a:r>
+              <a:rPr lang="bg-BG" dirty="0" smtClean="0"/>
+              <a:t>демо</a:t>
+            </a:r>
+            <a:endParaRPr lang="en-US" dirty="0"/>
+          </a:p>
+        </p:txBody>
+      </p:sp>
+      <p:pic>
+        <p:nvPicPr>
+          <p:cNvPr id="2050" name="Picture 2" descr="http://www.12manage.com/images/picture_management_by_exception.jpg"/>
+          <p:cNvPicPr>
+            <a:picLocks noChangeAspect="1" noChangeArrowheads="1"/>
+          </p:cNvPicPr>
+          <p:nvPr/>
+        </p:nvPicPr>
+        <p:blipFill>
+          <a:blip r:embed="rId2">
+            <a:extLst>
+              <a:ext uri="{28A0092B-C50C-407E-A947-70E740481C1C}">
+                <a14:useLocalDpi xmlns:a14="http://schemas.microsoft.com/office/drawing/2010/main" val="0"/>
+              </a:ext>
+            </a:extLst>
+          </a:blip>
+          <a:srcRect/>
+          <a:stretch>
+            <a:fillRect/>
+          </a:stretch>
+        </p:blipFill>
+        <p:spPr bwMode="auto">
+          <a:xfrm>
+            <a:off x="4055075" y="2097088"/>
+            <a:ext cx="4078674" cy="3765977"/>
+          </a:xfrm>
+          <a:prstGeom prst="rect">
+            <a:avLst/>
+          </a:prstGeom>
+          <a:noFill/>
+          <a:extLst>
+            <a:ext uri="{909E8E84-426E-40DD-AFC4-6F175D3DCCD1}">
+              <a14:hiddenFill xmlns:a14="http://schemas.microsoft.com/office/drawing/2010/main">
+                <a:solidFill>
+                  <a:srgbClr val="FFFFFF"/>
+                </a:solidFill>
+              </a14:hiddenFill>
+            </a:ext>
+          </a:extLst>
+        </p:spPr>
+      </p:pic>
+    </p:spTree>
+    <p:extLst>
+      <p:ext uri="{BB962C8B-B14F-4D97-AF65-F5344CB8AC3E}">
+        <p14:creationId xmlns:p14="http://schemas.microsoft.com/office/powerpoint/2010/main" val="902656761"/>
+      </p:ext>
+    </p:extLst>
+  </p:cSld>
+  <p:clrMapOvr>
+    <a:masterClrMapping/>
+  </p:clrMapOvr>
+</p:sld>
+</file>
+
+<file path=ppt/slides/slide16.xml><?xml version="1.0" encoding="utf-8"?>
+<p:sld xmlns:a="http://schemas.openxmlformats.org/drawingml/2006/main" xmlns:r="http://schemas.openxmlformats.org/officeDocument/2006/relationships" xmlns:p="http://schemas.openxmlformats.org/presentationml/2006/main">
+  <p:cSld>
+    <p:spTree>
+      <p:nvGrpSpPr>
+        <p:cNvPr id="1" name=""/>
+        <p:cNvGrpSpPr/>
+        <p:nvPr/>
+      </p:nvGrpSpPr>
+      <p:grpSpPr>
+        <a:xfrm>
+          <a:off x="0" y="0"/>
+          <a:ext cx="0" cy="0"/>
+          <a:chOff x="0" y="0"/>
+          <a:chExt cx="0" cy="0"/>
+        </a:xfrm>
+      </p:grpSpPr>
+      <p:sp>
+        <p:nvSpPr>
+          <p:cNvPr id="2" name="Title 1"/>
+          <p:cNvSpPr>
+            <a:spLocks noGrp="1"/>
+          </p:cNvSpPr>
+          <p:nvPr>
+            <p:ph type="title"/>
+          </p:nvPr>
+        </p:nvSpPr>
+        <p:spPr/>
+        <p:txBody>
+          <a:bodyPr/>
+          <a:lstStyle/>
+          <a:p>
+            <a:pPr algn="ctr"/>
+            <a:r>
+              <a:rPr lang="bg-BG" dirty="0" err="1" smtClean="0"/>
+              <a:t>Парсване</a:t>
+            </a:r>
+            <a:r>
+              <a:rPr lang="bg-BG" dirty="0" smtClean="0"/>
+              <a:t> на типове в </a:t>
+            </a:r>
+            <a:r>
+              <a:rPr lang="en-US" dirty="0" smtClean="0"/>
+              <a:t>JAVA</a:t>
+            </a:r>
+            <a:endParaRPr lang="en-US" dirty="0"/>
+          </a:p>
+        </p:txBody>
+      </p:sp>
+      <p:sp>
+        <p:nvSpPr>
+          <p:cNvPr id="3" name="Content Placeholder 2"/>
+          <p:cNvSpPr>
+            <a:spLocks noGrp="1"/>
+          </p:cNvSpPr>
+          <p:nvPr>
+            <p:ph idx="1"/>
+          </p:nvPr>
+        </p:nvSpPr>
+        <p:spPr/>
+        <p:txBody>
+          <a:bodyPr/>
+          <a:lstStyle/>
+          <a:p>
+            <a:r>
+              <a:rPr lang="bg-BG" dirty="0" smtClean="0"/>
+              <a:t>Парването представлява процес на превръщане на един тип данни в друг на база общ смисъл</a:t>
+            </a:r>
+          </a:p>
+          <a:p>
+            <a:r>
+              <a:rPr lang="bg-BG" dirty="0" smtClean="0"/>
+              <a:t>Всеки от референтите типове представящи примитивните типове (</a:t>
+            </a:r>
+            <a:r>
+              <a:rPr lang="en-US" dirty="0" smtClean="0"/>
+              <a:t>Integer, Double, </a:t>
+            </a:r>
+            <a:r>
+              <a:rPr lang="en-US" dirty="0" err="1" smtClean="0"/>
+              <a:t>Boalean</a:t>
+            </a:r>
+            <a:r>
+              <a:rPr lang="en-US" dirty="0" smtClean="0"/>
+              <a:t> ….</a:t>
+            </a:r>
+            <a:r>
+              <a:rPr lang="bg-BG" dirty="0" smtClean="0"/>
+              <a:t>)</a:t>
+            </a:r>
+            <a:r>
+              <a:rPr lang="en-US" dirty="0" smtClean="0"/>
+              <a:t> </a:t>
+            </a:r>
+            <a:r>
+              <a:rPr lang="bg-BG" dirty="0" smtClean="0"/>
+              <a:t>съдържа методи за </a:t>
+            </a:r>
+            <a:r>
+              <a:rPr lang="bg-BG" dirty="0" err="1" smtClean="0"/>
+              <a:t>парсване</a:t>
+            </a:r>
+            <a:r>
+              <a:rPr lang="en-US" dirty="0" smtClean="0"/>
+              <a:t> </a:t>
+            </a:r>
+            <a:r>
+              <a:rPr lang="bg-BG" dirty="0" smtClean="0"/>
+              <a:t>от </a:t>
+            </a:r>
+            <a:r>
+              <a:rPr lang="en-US" dirty="0" smtClean="0"/>
+              <a:t>string</a:t>
+            </a:r>
+            <a:endParaRPr lang="bg-BG" dirty="0" smtClean="0"/>
+          </a:p>
+          <a:p>
+            <a:r>
+              <a:rPr lang="bg-BG" dirty="0" err="1" smtClean="0"/>
+              <a:t>Парсването</a:t>
+            </a:r>
+            <a:r>
+              <a:rPr lang="bg-BG" dirty="0" smtClean="0"/>
+              <a:t> е операция, при която може да възникне изключение</a:t>
+            </a:r>
+            <a:endParaRPr lang="en-US" dirty="0"/>
+          </a:p>
+        </p:txBody>
+      </p:sp>
+    </p:spTree>
+    <p:extLst>
+      <p:ext uri="{BB962C8B-B14F-4D97-AF65-F5344CB8AC3E}">
+        <p14:creationId xmlns:p14="http://schemas.microsoft.com/office/powerpoint/2010/main" val="517837237"/>
+      </p:ext>
+    </p:extLst>
+  </p:cSld>
+  <p:clrMapOvr>
+    <a:masterClrMapping/>
+  </p:clrMapOvr>
+</p:sld>
+</file>
+
+<file path=ppt/slides/slide17.xml><?xml version="1.0" encoding="utf-8"?>
+<p:sld xmlns:a="http://schemas.openxmlformats.org/drawingml/2006/main" xmlns:r="http://schemas.openxmlformats.org/officeDocument/2006/relationships" xmlns:p="http://schemas.openxmlformats.org/presentationml/2006/main">
+  <p:cSld>
+    <p:spTree>
+      <p:nvGrpSpPr>
+        <p:cNvPr id="1" name=""/>
+        <p:cNvGrpSpPr/>
+        <p:nvPr/>
+      </p:nvGrpSpPr>
+      <p:grpSpPr>
+        <a:xfrm>
+          <a:off x="0" y="0"/>
+          <a:ext cx="0" cy="0"/>
+          <a:chOff x="0" y="0"/>
+          <a:chExt cx="0" cy="0"/>
+        </a:xfrm>
+      </p:grpSpPr>
+      <p:sp>
+        <p:nvSpPr>
+          <p:cNvPr id="2" name="Title 1"/>
+          <p:cNvSpPr>
+            <a:spLocks noGrp="1"/>
+          </p:cNvSpPr>
+          <p:nvPr>
+            <p:ph type="title"/>
+          </p:nvPr>
+        </p:nvSpPr>
+        <p:spPr/>
+        <p:txBody>
+          <a:bodyPr/>
+          <a:lstStyle/>
+          <a:p>
+            <a:pPr algn="ctr"/>
+            <a:r>
+              <a:rPr lang="bg-BG" dirty="0" err="1"/>
+              <a:t>Парсване</a:t>
+            </a:r>
+            <a:r>
+              <a:rPr lang="bg-BG" dirty="0"/>
+              <a:t> на типове в </a:t>
+            </a:r>
+            <a:r>
+              <a:rPr lang="en-US" dirty="0" smtClean="0"/>
+              <a:t>JAVA</a:t>
+            </a:r>
+            <a:r>
+              <a:rPr lang="bg-BG" dirty="0" smtClean="0"/>
+              <a:t> демо</a:t>
+            </a:r>
+            <a:endParaRPr lang="en-US" dirty="0"/>
+          </a:p>
+        </p:txBody>
+      </p:sp>
+      <p:pic>
+        <p:nvPicPr>
+          <p:cNvPr id="3076" name="Picture 4" descr="http://www.devworx.in/assets/parse.jpg"/>
+          <p:cNvPicPr>
+            <a:picLocks noChangeAspect="1" noChangeArrowheads="1"/>
+          </p:cNvPicPr>
+          <p:nvPr/>
+        </p:nvPicPr>
+        <p:blipFill>
+          <a:blip r:embed="rId2">
+            <a:extLst>
+              <a:ext uri="{28A0092B-C50C-407E-A947-70E740481C1C}">
+                <a14:useLocalDpi xmlns:a14="http://schemas.microsoft.com/office/drawing/2010/main" val="0"/>
+              </a:ext>
+            </a:extLst>
+          </a:blip>
+          <a:srcRect/>
+          <a:stretch>
+            <a:fillRect/>
+          </a:stretch>
+        </p:blipFill>
+        <p:spPr bwMode="auto">
+          <a:xfrm>
+            <a:off x="3989365" y="2097088"/>
+            <a:ext cx="4210093" cy="3759012"/>
+          </a:xfrm>
+          <a:prstGeom prst="rect">
+            <a:avLst/>
+          </a:prstGeom>
+          <a:noFill/>
+          <a:extLst>
+            <a:ext uri="{909E8E84-426E-40DD-AFC4-6F175D3DCCD1}">
+              <a14:hiddenFill xmlns:a14="http://schemas.microsoft.com/office/drawing/2010/main">
+                <a:solidFill>
+                  <a:srgbClr val="FFFFFF"/>
+                </a:solidFill>
+              </a14:hiddenFill>
+            </a:ext>
+          </a:extLst>
+        </p:spPr>
+      </p:pic>
+    </p:spTree>
+    <p:extLst>
+      <p:ext uri="{BB962C8B-B14F-4D97-AF65-F5344CB8AC3E}">
+        <p14:creationId xmlns:p14="http://schemas.microsoft.com/office/powerpoint/2010/main" val="2123099028"/>
+      </p:ext>
+    </p:extLst>
+  </p:cSld>
+  <p:clrMapOvr>
+    <a:masterClrMapping/>
+  </p:clrMapOvr>
+</p:sld>
+</file>
+
+<file path=ppt/slides/slide18.xml><?xml version="1.0" encoding="utf-8"?>
+<p:sld xmlns:a="http://schemas.openxmlformats.org/drawingml/2006/main" xmlns:r="http://schemas.openxmlformats.org/officeDocument/2006/relationships" xmlns:p="http://schemas.openxmlformats.org/presentationml/2006/main">
+  <p:cSld>
+    <p:spTree>
+      <p:nvGrpSpPr>
+        <p:cNvPr id="1" name=""/>
+        <p:cNvGrpSpPr/>
+        <p:nvPr/>
+      </p:nvGrpSpPr>
+      <p:grpSpPr>
+        <a:xfrm>
+          <a:off x="0" y="0"/>
+          <a:ext cx="0" cy="0"/>
+          <a:chOff x="0" y="0"/>
+          <a:chExt cx="0" cy="0"/>
+        </a:xfrm>
+      </p:grpSpPr>
+      <p:sp>
+        <p:nvSpPr>
+          <p:cNvPr id="2" name="Title 1"/>
+          <p:cNvSpPr>
+            <a:spLocks noGrp="1"/>
+          </p:cNvSpPr>
+          <p:nvPr>
+            <p:ph type="title"/>
+          </p:nvPr>
+        </p:nvSpPr>
+        <p:spPr/>
+        <p:txBody>
+          <a:bodyPr/>
+          <a:lstStyle/>
+          <a:p>
+            <a:pPr algn="ctr"/>
+            <a:r>
+              <a:rPr lang="bg-BG" dirty="0" smtClean="0"/>
+              <a:t>задача</a:t>
+            </a:r>
+            <a:endParaRPr lang="en-US" dirty="0"/>
+          </a:p>
+        </p:txBody>
+      </p:sp>
+      <p:sp>
+        <p:nvSpPr>
+          <p:cNvPr id="3" name="Content Placeholder 2"/>
+          <p:cNvSpPr>
+            <a:spLocks noGrp="1"/>
+          </p:cNvSpPr>
+          <p:nvPr>
+            <p:ph idx="1"/>
+          </p:nvPr>
+        </p:nvSpPr>
+        <p:spPr/>
+        <p:txBody>
+          <a:bodyPr/>
+          <a:lstStyle/>
+          <a:p>
+            <a:r>
+              <a:rPr lang="bg-BG" dirty="0" smtClean="0"/>
+              <a:t>Направете програма, която приема 2 дробни числа и дели първото на второто. </a:t>
+            </a:r>
+          </a:p>
+          <a:p>
+            <a:pPr marL="0" indent="0">
+              <a:buNone/>
+            </a:pPr>
+            <a:r>
+              <a:rPr lang="bg-BG" dirty="0" smtClean="0"/>
+              <a:t>Използвайте </a:t>
+            </a:r>
+            <a:r>
+              <a:rPr lang="en-US" dirty="0" smtClean="0"/>
+              <a:t>try…catch… </a:t>
+            </a:r>
+            <a:r>
+              <a:rPr lang="bg-BG" dirty="0" smtClean="0"/>
+              <a:t>блок с всички възможни типове изключения</a:t>
+            </a:r>
+            <a:endParaRPr lang="en-US" dirty="0"/>
+          </a:p>
+        </p:txBody>
+      </p:sp>
+    </p:spTree>
+    <p:extLst>
+      <p:ext uri="{BB962C8B-B14F-4D97-AF65-F5344CB8AC3E}">
+        <p14:creationId xmlns:p14="http://schemas.microsoft.com/office/powerpoint/2010/main" val="2795062102"/>
+      </p:ext>
+    </p:extLst>
+  </p:cSld>
+  <p:clrMapOvr>
+    <a:masterClrMapping/>
+  </p:clrMapOvr>
+</p:sld>
+</file>
+
+<file path=ppt/slides/slide19.xml><?xml version="1.0" encoding="utf-8"?>
+<p:sld xmlns:a="http://schemas.openxmlformats.org/drawingml/2006/main" xmlns:r="http://schemas.openxmlformats.org/officeDocument/2006/relationships" xmlns:p="http://schemas.openxmlformats.org/presentationml/2006/main">
+  <p:cSld>
+    <p:spTree>
+      <p:nvGrpSpPr>
+        <p:cNvPr id="1" name=""/>
+        <p:cNvGrpSpPr/>
+        <p:nvPr/>
+      </p:nvGrpSpPr>
+      <p:grpSpPr>
+        <a:xfrm>
+          <a:off x="0" y="0"/>
+          <a:ext cx="0" cy="0"/>
+          <a:chOff x="0" y="0"/>
+          <a:chExt cx="0" cy="0"/>
+        </a:xfrm>
+      </p:grpSpPr>
+      <p:sp>
+        <p:nvSpPr>
+          <p:cNvPr id="2" name="Title 1"/>
+          <p:cNvSpPr>
+            <a:spLocks noGrp="1"/>
+          </p:cNvSpPr>
+          <p:nvPr>
+            <p:ph type="title"/>
+          </p:nvPr>
+        </p:nvSpPr>
+        <p:spPr/>
+        <p:txBody>
+          <a:bodyPr/>
+          <a:lstStyle/>
+          <a:p>
+            <a:pPr algn="ctr"/>
+            <a:r>
+              <a:rPr lang="bg-BG" dirty="0" smtClean="0"/>
+              <a:t>Въпроси</a:t>
+            </a:r>
+            <a:endParaRPr lang="en-US" dirty="0"/>
+          </a:p>
+        </p:txBody>
+      </p:sp>
+      <p:pic>
+        <p:nvPicPr>
+          <p:cNvPr id="4098" name="Picture 2" descr="http://cdn.property118.com/wp-content/uploads/2014/12/Start-of-tenancy-few-questions.jpg"/>
+          <p:cNvPicPr>
+            <a:picLocks noChangeAspect="1" noChangeArrowheads="1"/>
+          </p:cNvPicPr>
+          <p:nvPr/>
+        </p:nvPicPr>
+        <p:blipFill>
+          <a:blip r:embed="rId2">
+            <a:extLst>
+              <a:ext uri="{28A0092B-C50C-407E-A947-70E740481C1C}">
+                <a14:useLocalDpi xmlns:a14="http://schemas.microsoft.com/office/drawing/2010/main" val="0"/>
+              </a:ext>
+            </a:extLst>
+          </a:blip>
+          <a:srcRect/>
+          <a:stretch>
+            <a:fillRect/>
+          </a:stretch>
+        </p:blipFill>
+        <p:spPr bwMode="auto">
+          <a:xfrm>
+            <a:off x="3904413" y="2097088"/>
+            <a:ext cx="4379998" cy="4379998"/>
+          </a:xfrm>
+          <a:prstGeom prst="rect">
+            <a:avLst/>
+          </a:prstGeom>
+          <a:noFill/>
+          <a:extLst>
+            <a:ext uri="{909E8E84-426E-40DD-AFC4-6F175D3DCCD1}">
+              <a14:hiddenFill xmlns:a14="http://schemas.microsoft.com/office/drawing/2010/main">
+                <a:solidFill>
+                  <a:srgbClr val="FFFFFF"/>
+                </a:solidFill>
+              </a14:hiddenFill>
+            </a:ext>
+          </a:extLst>
+        </p:spPr>
+      </p:pic>
+    </p:spTree>
+    <p:extLst>
+      <p:ext uri="{BB962C8B-B14F-4D97-AF65-F5344CB8AC3E}">
+        <p14:creationId xmlns:p14="http://schemas.microsoft.com/office/powerpoint/2010/main" val="763870540"/>
+      </p:ext>
+    </p:extLst>
+  </p:cSld>
+  <p:clrMapOvr>
+    <a:masterClrMapping/>
+  </p:clrMapOvr>
+</p:sld>
+</file>
+
 <file path=ppt/slides/slide2.xml><?xml version="1.0" encoding="utf-8"?>
 <p:sld xmlns:a="http://schemas.openxmlformats.org/drawingml/2006/main" xmlns:r="http://schemas.openxmlformats.org/officeDocument/2006/relationships" xmlns:p="http://schemas.openxmlformats.org/presentationml/2006/main">
   <p:cSld>

</xml_diff>